<commit_message>
update turn-in 1 before presenting
</commit_message>
<xml_diff>
--- a/vystup_1/STP výstup 1.pptx
+++ b/vystup_1/STP výstup 1.pptx
@@ -122,6 +122,7 @@
 <p1510:revInfo xmlns:a="http://schemas.openxmlformats.org/drawingml/2006/main" xmlns:r="http://schemas.openxmlformats.org/officeDocument/2006/relationships" xmlns:p1510="http://schemas.microsoft.com/office/powerpoint/2015/10/main">
   <p1510:revLst>
     <p1510:client id="{227D9D2D-3DE1-921B-BF87-A44E5281BDC6}" v="515" dt="2025-11-19T10:40:34.366"/>
+    <p1510:client id="{9512C9D1-8DCE-EAEE-4416-AF53118222A3}" v="56" dt="2025-11-20T06:54:26.210"/>
   </p1510:revLst>
 </p1510:revInfo>
 </file>
@@ -3773,14 +3774,22 @@
           </a:xfrm>
         </p:spPr>
         <p:txBody>
-          <a:bodyPr vert="horz" lIns="91440" tIns="45720" rIns="91440" bIns="45720" rtlCol="0">
+          <a:bodyPr vert="horz" lIns="91440" tIns="45720" rIns="91440" bIns="45720" rtlCol="0" anchor="t">
             <a:normAutofit/>
           </a:bodyPr>
           <a:lstStyle/>
           <a:p>
             <a:r>
-              <a:rPr lang="en-US" sz="1800"/>
-              <a:t>Nákup součástek</a:t>
+              <a:rPr lang="en-US" sz="1800" dirty="0" err="1"/>
+              <a:t>Nákup</a:t>
+            </a:r>
+            <a:r>
+              <a:rPr lang="en-US" sz="1800" dirty="0"/>
+              <a:t> </a:t>
+            </a:r>
+            <a:r>
+              <a:rPr lang="en-US" sz="1800" dirty="0" err="1"/>
+              <a:t>součástek</a:t>
             </a:r>
           </a:p>
           <a:p>
@@ -3789,8 +3798,8 @@
               <a:buChar char="o"/>
             </a:pPr>
             <a:r>
-              <a:rPr lang="en-US"/>
-              <a:t>RP2040-Zero</a:t>
+              <a:rPr lang="en-US" dirty="0" err="1"/>
+              <a:t>Mikrokontroler</a:t>
             </a:r>
           </a:p>
           <a:p>
@@ -3799,20 +3808,32 @@
               <a:buChar char="o"/>
             </a:pPr>
             <a:r>
-              <a:rPr lang="en-US"/>
-              <a:t>Kailh Choc V1 Red</a:t>
-            </a:r>
-          </a:p>
-          <a:p>
-            <a:r>
-              <a:rPr lang="en-US" sz="1800"/>
-              <a:t>TinyUSB prototyp</a:t>
-            </a:r>
-          </a:p>
-          <a:p>
-            <a:r>
-              <a:rPr lang="en-US" sz="1800"/>
-              <a:t>PCB - EasyEDA</a:t>
+              <a:rPr lang="en-US" dirty="0" err="1"/>
+              <a:t>Spínače</a:t>
+            </a:r>
+          </a:p>
+          <a:p>
+            <a:r>
+              <a:rPr lang="en-US" sz="1800" dirty="0" err="1"/>
+              <a:t>TinyUSB</a:t>
+            </a:r>
+            <a:r>
+              <a:rPr lang="en-US" sz="1800" dirty="0"/>
+              <a:t> </a:t>
+            </a:r>
+            <a:r>
+              <a:rPr lang="en-US" sz="1800" dirty="0" err="1"/>
+              <a:t>prototyp</a:t>
+            </a:r>
+          </a:p>
+          <a:p>
+            <a:r>
+              <a:rPr lang="en-US" sz="1800" dirty="0"/>
+              <a:t>PCB - </a:t>
+            </a:r>
+            <a:r>
+              <a:rPr lang="en-US" sz="1800" dirty="0" err="1"/>
+              <a:t>EasyEDA</a:t>
             </a:r>
           </a:p>
         </p:txBody>
@@ -3912,8 +3933,24 @@
           <a:lstStyle/>
           <a:p>
             <a:r>
+              <a:rPr lang="en-US" dirty="0" err="1"/>
+              <a:t>Mikrokontroler</a:t>
+            </a:r>
+            <a:r>
               <a:rPr lang="en-US" dirty="0"/>
-              <a:t>RP2040-Zero</a:t>
+              <a:t> – </a:t>
+            </a:r>
+            <a:r>
+              <a:rPr lang="en-US" dirty="0" err="1"/>
+              <a:t>srdce</a:t>
+            </a:r>
+            <a:r>
+              <a:rPr lang="en-US" dirty="0"/>
+              <a:t> </a:t>
+            </a:r>
+            <a:r>
+              <a:rPr lang="en-US" dirty="0" err="1"/>
+              <a:t>klávesnice</a:t>
             </a:r>
           </a:p>
         </p:txBody>
@@ -4021,11 +4058,23 @@
           <a:p>
             <a:r>
               <a:rPr lang="en-US" dirty="0" err="1"/>
-              <a:t>Kailh</a:t>
+              <a:t>Mechanické</a:t>
             </a:r>
             <a:r>
               <a:rPr lang="en-US" dirty="0"/>
-              <a:t> Choc V1 Red</a:t>
+              <a:t> </a:t>
+            </a:r>
+            <a:r>
+              <a:rPr lang="en-US" dirty="0" err="1"/>
+              <a:t>nízkoprofilové</a:t>
+            </a:r>
+            <a:r>
+              <a:rPr lang="en-US" dirty="0"/>
+              <a:t> </a:t>
+            </a:r>
+            <a:r>
+              <a:rPr lang="en-US" dirty="0" err="1"/>
+              <a:t>spínače</a:t>
             </a:r>
           </a:p>
         </p:txBody>

</xml_diff>